<commit_message>
Lonely Lobster end user documentation cont'd
</commit_message>
<xml_diff>
--- a/docu/LonelyLobsterDemo-labelled.pptx
+++ b/docu/LonelyLobsterDemo-labelled.pptx
@@ -4953,7 +4953,7 @@
         </p:blipFill>
         <p:spPr>
           <a:xfrm>
-            <a:off x="1989287" y="3390899"/>
+            <a:off x="2691681" y="6216651"/>
             <a:ext cx="8104038" cy="298449"/>
           </a:xfrm>
           <a:prstGeom prst="rect">
@@ -4961,6 +4961,426 @@
           </a:prstGeom>
         </p:spPr>
       </p:pic>
+      <p:sp>
+        <p:nvSpPr>
+          <p:cNvPr id="10" name="Ellipse 9">
+            <a:extLst>
+              <a:ext uri="{FF2B5EF4-FFF2-40B4-BE49-F238E27FC236}">
+                <a16:creationId xmlns:a16="http://schemas.microsoft.com/office/drawing/2014/main" id="{E4AC0FE5-3004-F49B-FAFA-9429135C8225}"/>
+              </a:ext>
+            </a:extLst>
+          </p:cNvPr>
+          <p:cNvSpPr/>
+          <p:nvPr/>
+        </p:nvSpPr>
+        <p:spPr>
+          <a:xfrm>
+            <a:off x="3467100" y="596215"/>
+            <a:ext cx="317500" cy="298450"/>
+          </a:xfrm>
+          <a:prstGeom prst="ellipse">
+            <a:avLst/>
+          </a:prstGeom>
+          <a:ln w="57150">
+            <a:solidFill>
+              <a:schemeClr val="bg1"/>
+            </a:solidFill>
+          </a:ln>
+        </p:spPr>
+        <p:style>
+          <a:lnRef idx="2">
+            <a:schemeClr val="accent1">
+              <a:shade val="15000"/>
+            </a:schemeClr>
+          </a:lnRef>
+          <a:fillRef idx="1">
+            <a:schemeClr val="accent1"/>
+          </a:fillRef>
+          <a:effectRef idx="0">
+            <a:schemeClr val="accent1"/>
+          </a:effectRef>
+          <a:fontRef idx="minor">
+            <a:schemeClr val="lt1"/>
+          </a:fontRef>
+        </p:style>
+        <p:txBody>
+          <a:bodyPr rtlCol="0" anchor="ctr"/>
+          <a:lstStyle/>
+          <a:p>
+            <a:pPr algn="ctr"/>
+            <a:r>
+              <a:rPr lang="de-DE" sz="1400" b="1" dirty="0">
+                <a:solidFill>
+                  <a:schemeClr val="bg1"/>
+                </a:solidFill>
+              </a:rPr>
+              <a:t>4</a:t>
+            </a:r>
+          </a:p>
+        </p:txBody>
+      </p:sp>
+      <p:grpSp>
+        <p:nvGrpSpPr>
+          <p:cNvPr id="13" name="Gruppieren 12">
+            <a:extLst>
+              <a:ext uri="{FF2B5EF4-FFF2-40B4-BE49-F238E27FC236}">
+                <a16:creationId xmlns:a16="http://schemas.microsoft.com/office/drawing/2014/main" id="{7ABBB934-766D-64E8-E6C4-395F8DF4F905}"/>
+              </a:ext>
+            </a:extLst>
+          </p:cNvPr>
+          <p:cNvGrpSpPr/>
+          <p:nvPr/>
+        </p:nvGrpSpPr>
+        <p:grpSpPr>
+          <a:xfrm>
+            <a:off x="3880838" y="342900"/>
+            <a:ext cx="5167313" cy="828784"/>
+            <a:chOff x="4065587" y="1670050"/>
+            <a:chExt cx="6027738" cy="966787"/>
+          </a:xfrm>
+        </p:grpSpPr>
+        <p:pic>
+          <p:nvPicPr>
+            <p:cNvPr id="9" name="Grafik 8" descr="Ein Bild, das Text, Schrift, Screenshot enthält.&#10;&#10;KI-generierte Inhalte können fehlerhaft sein.">
+              <a:extLst>
+                <a:ext uri="{FF2B5EF4-FFF2-40B4-BE49-F238E27FC236}">
+                  <a16:creationId xmlns:a16="http://schemas.microsoft.com/office/drawing/2014/main" id="{E1E5ED57-386B-4EFA-39E8-97A216B9DFDB}"/>
+                </a:ext>
+              </a:extLst>
+            </p:cNvPr>
+            <p:cNvPicPr>
+              <a:picLocks noChangeAspect="1"/>
+            </p:cNvPicPr>
+            <p:nvPr/>
+          </p:nvPicPr>
+          <p:blipFill>
+            <a:blip r:embed="rId3">
+              <a:extLst>
+                <a:ext uri="{28A0092B-C50C-407E-A947-70E740481C1C}">
+                  <a14:useLocalDpi xmlns:a14="http://schemas.microsoft.com/office/drawing/2010/main" val="0"/>
+                </a:ext>
+              </a:extLst>
+            </a:blip>
+            <a:stretch>
+              <a:fillRect/>
+            </a:stretch>
+          </p:blipFill>
+          <p:spPr>
+            <a:xfrm>
+              <a:off x="4065587" y="1670050"/>
+              <a:ext cx="2790913" cy="966787"/>
+            </a:xfrm>
+            <a:prstGeom prst="rect">
+              <a:avLst/>
+            </a:prstGeom>
+          </p:spPr>
+        </p:pic>
+        <p:pic>
+          <p:nvPicPr>
+            <p:cNvPr id="12" name="Grafik 11" descr="Ein Bild, das Text, Schrift, Screenshot enthält.&#10;&#10;KI-generierte Inhalte können fehlerhaft sein.">
+              <a:extLst>
+                <a:ext uri="{FF2B5EF4-FFF2-40B4-BE49-F238E27FC236}">
+                  <a16:creationId xmlns:a16="http://schemas.microsoft.com/office/drawing/2014/main" id="{80D981D0-3C10-7A47-E3FE-C2E3E510BBB5}"/>
+                </a:ext>
+              </a:extLst>
+            </p:cNvPr>
+            <p:cNvPicPr>
+              <a:picLocks noChangeAspect="1"/>
+            </p:cNvPicPr>
+            <p:nvPr/>
+          </p:nvPicPr>
+          <p:blipFill>
+            <a:blip r:embed="rId4">
+              <a:extLst>
+                <a:ext uri="{28A0092B-C50C-407E-A947-70E740481C1C}">
+                  <a14:useLocalDpi xmlns:a14="http://schemas.microsoft.com/office/drawing/2010/main" val="0"/>
+                </a:ext>
+              </a:extLst>
+            </a:blip>
+            <a:stretch>
+              <a:fillRect/>
+            </a:stretch>
+          </p:blipFill>
+          <p:spPr>
+            <a:xfrm>
+              <a:off x="7188677" y="1704864"/>
+              <a:ext cx="2904648" cy="931973"/>
+            </a:xfrm>
+            <a:prstGeom prst="rect">
+              <a:avLst/>
+            </a:prstGeom>
+          </p:spPr>
+        </p:pic>
+      </p:grpSp>
+      <p:sp>
+        <p:nvSpPr>
+          <p:cNvPr id="16" name="Ellipse 15">
+            <a:extLst>
+              <a:ext uri="{FF2B5EF4-FFF2-40B4-BE49-F238E27FC236}">
+                <a16:creationId xmlns:a16="http://schemas.microsoft.com/office/drawing/2014/main" id="{3B351AD5-6C34-872D-0C7B-321089594E3E}"/>
+              </a:ext>
+            </a:extLst>
+          </p:cNvPr>
+          <p:cNvSpPr/>
+          <p:nvPr/>
+        </p:nvSpPr>
+        <p:spPr>
+          <a:xfrm>
+            <a:off x="3467100" y="1513790"/>
+            <a:ext cx="317500" cy="298450"/>
+          </a:xfrm>
+          <a:prstGeom prst="ellipse">
+            <a:avLst/>
+          </a:prstGeom>
+          <a:ln w="57150">
+            <a:solidFill>
+              <a:schemeClr val="bg1"/>
+            </a:solidFill>
+          </a:ln>
+        </p:spPr>
+        <p:style>
+          <a:lnRef idx="2">
+            <a:schemeClr val="accent1">
+              <a:shade val="15000"/>
+            </a:schemeClr>
+          </a:lnRef>
+          <a:fillRef idx="1">
+            <a:schemeClr val="accent1"/>
+          </a:fillRef>
+          <a:effectRef idx="0">
+            <a:schemeClr val="accent1"/>
+          </a:effectRef>
+          <a:fontRef idx="minor">
+            <a:schemeClr val="lt1"/>
+          </a:fontRef>
+        </p:style>
+        <p:txBody>
+          <a:bodyPr rtlCol="0" anchor="ctr"/>
+          <a:lstStyle/>
+          <a:p>
+            <a:pPr algn="ctr"/>
+            <a:r>
+              <a:rPr lang="de-DE" sz="1400" b="1" dirty="0">
+                <a:solidFill>
+                  <a:schemeClr val="bg1"/>
+                </a:solidFill>
+              </a:rPr>
+              <a:t>5</a:t>
+            </a:r>
+          </a:p>
+        </p:txBody>
+      </p:sp>
+      <p:pic>
+        <p:nvPicPr>
+          <p:cNvPr id="18" name="Grafik 17">
+            <a:extLst>
+              <a:ext uri="{FF2B5EF4-FFF2-40B4-BE49-F238E27FC236}">
+                <a16:creationId xmlns:a16="http://schemas.microsoft.com/office/drawing/2014/main" id="{2B49D7AE-DA92-98D5-2DC2-7F56065E7679}"/>
+              </a:ext>
+            </a:extLst>
+          </p:cNvPr>
+          <p:cNvPicPr>
+            <a:picLocks noChangeAspect="1"/>
+          </p:cNvPicPr>
+          <p:nvPr/>
+        </p:nvPicPr>
+        <p:blipFill>
+          <a:blip r:embed="rId5"/>
+          <a:stretch>
+            <a:fillRect/>
+          </a:stretch>
+        </p:blipFill>
+        <p:spPr>
+          <a:xfrm>
+            <a:off x="3894941" y="1366883"/>
+            <a:ext cx="5132409" cy="714963"/>
+          </a:xfrm>
+          <a:prstGeom prst="rect">
+            <a:avLst/>
+          </a:prstGeom>
+        </p:spPr>
+      </p:pic>
+      <p:pic>
+        <p:nvPicPr>
+          <p:cNvPr id="22" name="Grafik 21">
+            <a:extLst>
+              <a:ext uri="{FF2B5EF4-FFF2-40B4-BE49-F238E27FC236}">
+                <a16:creationId xmlns:a16="http://schemas.microsoft.com/office/drawing/2014/main" id="{C3EE1900-74C4-EB35-CFEB-8BDAE18DDC4F}"/>
+              </a:ext>
+            </a:extLst>
+          </p:cNvPr>
+          <p:cNvPicPr>
+            <a:picLocks noChangeAspect="1"/>
+          </p:cNvPicPr>
+          <p:nvPr/>
+        </p:nvPicPr>
+        <p:blipFill>
+          <a:blip r:embed="rId6"/>
+          <a:stretch>
+            <a:fillRect/>
+          </a:stretch>
+        </p:blipFill>
+        <p:spPr>
+          <a:xfrm>
+            <a:off x="3894941" y="2207632"/>
+            <a:ext cx="3429025" cy="790581"/>
+          </a:xfrm>
+          <a:prstGeom prst="rect">
+            <a:avLst/>
+          </a:prstGeom>
+        </p:spPr>
+      </p:pic>
+      <p:sp>
+        <p:nvSpPr>
+          <p:cNvPr id="23" name="Ellipse 22">
+            <a:extLst>
+              <a:ext uri="{FF2B5EF4-FFF2-40B4-BE49-F238E27FC236}">
+                <a16:creationId xmlns:a16="http://schemas.microsoft.com/office/drawing/2014/main" id="{F4C962E9-C31C-1590-8329-AA717B72FFAB}"/>
+              </a:ext>
+            </a:extLst>
+          </p:cNvPr>
+          <p:cNvSpPr/>
+          <p:nvPr/>
+        </p:nvSpPr>
+        <p:spPr>
+          <a:xfrm>
+            <a:off x="3467100" y="2431365"/>
+            <a:ext cx="317500" cy="298450"/>
+          </a:xfrm>
+          <a:prstGeom prst="ellipse">
+            <a:avLst/>
+          </a:prstGeom>
+          <a:ln w="57150">
+            <a:solidFill>
+              <a:schemeClr val="bg1"/>
+            </a:solidFill>
+          </a:ln>
+        </p:spPr>
+        <p:style>
+          <a:lnRef idx="2">
+            <a:schemeClr val="accent1">
+              <a:shade val="15000"/>
+            </a:schemeClr>
+          </a:lnRef>
+          <a:fillRef idx="1">
+            <a:schemeClr val="accent1"/>
+          </a:fillRef>
+          <a:effectRef idx="0">
+            <a:schemeClr val="accent1"/>
+          </a:effectRef>
+          <a:fontRef idx="minor">
+            <a:schemeClr val="lt1"/>
+          </a:fontRef>
+        </p:style>
+        <p:txBody>
+          <a:bodyPr rtlCol="0" anchor="ctr"/>
+          <a:lstStyle/>
+          <a:p>
+            <a:pPr algn="ctr"/>
+            <a:r>
+              <a:rPr lang="de-DE" sz="1400" b="1" dirty="0">
+                <a:solidFill>
+                  <a:schemeClr val="bg1"/>
+                </a:solidFill>
+              </a:rPr>
+              <a:t>6</a:t>
+            </a:r>
+          </a:p>
+        </p:txBody>
+      </p:sp>
+      <p:pic>
+        <p:nvPicPr>
+          <p:cNvPr id="25" name="Grafik 24">
+            <a:extLst>
+              <a:ext uri="{FF2B5EF4-FFF2-40B4-BE49-F238E27FC236}">
+                <a16:creationId xmlns:a16="http://schemas.microsoft.com/office/drawing/2014/main" id="{6DAE910E-B264-54BB-C731-0696009CBADB}"/>
+              </a:ext>
+            </a:extLst>
+          </p:cNvPr>
+          <p:cNvPicPr>
+            <a:picLocks noChangeAspect="1"/>
+          </p:cNvPicPr>
+          <p:nvPr/>
+        </p:nvPicPr>
+        <p:blipFill>
+          <a:blip r:embed="rId7"/>
+          <a:stretch>
+            <a:fillRect/>
+          </a:stretch>
+        </p:blipFill>
+        <p:spPr>
+          <a:xfrm>
+            <a:off x="3894941" y="3173410"/>
+            <a:ext cx="1743088" cy="714380"/>
+          </a:xfrm>
+          <a:prstGeom prst="rect">
+            <a:avLst/>
+          </a:prstGeom>
+        </p:spPr>
+      </p:pic>
+      <p:sp>
+        <p:nvSpPr>
+          <p:cNvPr id="26" name="Ellipse 25">
+            <a:extLst>
+              <a:ext uri="{FF2B5EF4-FFF2-40B4-BE49-F238E27FC236}">
+                <a16:creationId xmlns:a16="http://schemas.microsoft.com/office/drawing/2014/main" id="{6B5F800A-8594-7CC7-21C8-6A614DC5F49C}"/>
+              </a:ext>
+            </a:extLst>
+          </p:cNvPr>
+          <p:cNvSpPr/>
+          <p:nvPr/>
+        </p:nvSpPr>
+        <p:spPr>
+          <a:xfrm>
+            <a:off x="3467100" y="3348940"/>
+            <a:ext cx="317500" cy="298450"/>
+          </a:xfrm>
+          <a:prstGeom prst="ellipse">
+            <a:avLst/>
+          </a:prstGeom>
+          <a:ln w="57150">
+            <a:solidFill>
+              <a:schemeClr val="bg1"/>
+            </a:solidFill>
+          </a:ln>
+        </p:spPr>
+        <p:style>
+          <a:lnRef idx="2">
+            <a:schemeClr val="accent1">
+              <a:shade val="15000"/>
+            </a:schemeClr>
+          </a:lnRef>
+          <a:fillRef idx="1">
+            <a:schemeClr val="accent1"/>
+          </a:fillRef>
+          <a:effectRef idx="0">
+            <a:schemeClr val="accent1"/>
+          </a:effectRef>
+          <a:fontRef idx="minor">
+            <a:schemeClr val="lt1"/>
+          </a:fontRef>
+        </p:style>
+        <p:txBody>
+          <a:bodyPr rtlCol="0" anchor="ctr"/>
+          <a:lstStyle/>
+          <a:p>
+            <a:pPr algn="ctr"/>
+            <a:r>
+              <a:rPr lang="de-DE" sz="1400" b="1">
+                <a:solidFill>
+                  <a:schemeClr val="bg1"/>
+                </a:solidFill>
+              </a:rPr>
+              <a:t>7</a:t>
+            </a:r>
+            <a:endParaRPr lang="de-DE" sz="1400" b="1" dirty="0">
+              <a:solidFill>
+                <a:schemeClr val="bg1"/>
+              </a:solidFill>
+            </a:endParaRPr>
+          </a:p>
+        </p:txBody>
+      </p:sp>
     </p:spTree>
     <p:extLst>
       <p:ext uri="{BB962C8B-B14F-4D97-AF65-F5344CB8AC3E}">

</xml_diff>